<commit_message>
Pushing updates to the power point slides
</commit_message>
<xml_diff>
--- a/Project 1 Slides - Smith.pptx
+++ b/Project 1 Slides - Smith.pptx
@@ -11,6 +11,9 @@
     <p:sldId id="259" r:id="rId5"/>
     <p:sldId id="260" r:id="rId6"/>
     <p:sldId id="261" r:id="rId7"/>
+    <p:sldId id="263" r:id="rId8"/>
+    <p:sldId id="264" r:id="rId9"/>
+    <p:sldId id="262" r:id="rId10"/>
   </p:sldIdLst>
   <p:sldSz cx="12192000" cy="6858000"/>
   <p:notesSz cx="6858000" cy="9144000"/>
@@ -474,7 +477,7 @@
           <a:p>
             <a:fld id="{D865CB24-D727-4CC3-94C1-E7095621080B}" type="datetimeFigureOut">
               <a:rPr lang="en-US" smtClean="0"/>
-              <a:t>8/8/2024</a:t>
+              <a:t>8/10/2024</a:t>
             </a:fld>
             <a:endParaRPr lang="en-US"/>
           </a:p>
@@ -672,7 +675,7 @@
           <a:p>
             <a:fld id="{D865CB24-D727-4CC3-94C1-E7095621080B}" type="datetimeFigureOut">
               <a:rPr lang="en-US" smtClean="0"/>
-              <a:t>8/8/2024</a:t>
+              <a:t>8/10/2024</a:t>
             </a:fld>
             <a:endParaRPr lang="en-US"/>
           </a:p>
@@ -880,7 +883,7 @@
           <a:p>
             <a:fld id="{D865CB24-D727-4CC3-94C1-E7095621080B}" type="datetimeFigureOut">
               <a:rPr lang="en-US" smtClean="0"/>
-              <a:t>8/8/2024</a:t>
+              <a:t>8/10/2024</a:t>
             </a:fld>
             <a:endParaRPr lang="en-US"/>
           </a:p>
@@ -1078,7 +1081,7 @@
           <a:p>
             <a:fld id="{D865CB24-D727-4CC3-94C1-E7095621080B}" type="datetimeFigureOut">
               <a:rPr lang="en-US" smtClean="0"/>
-              <a:t>8/8/2024</a:t>
+              <a:t>8/10/2024</a:t>
             </a:fld>
             <a:endParaRPr lang="en-US"/>
           </a:p>
@@ -1353,7 +1356,7 @@
           <a:p>
             <a:fld id="{D865CB24-D727-4CC3-94C1-E7095621080B}" type="datetimeFigureOut">
               <a:rPr lang="en-US" smtClean="0"/>
-              <a:t>8/8/2024</a:t>
+              <a:t>8/10/2024</a:t>
             </a:fld>
             <a:endParaRPr lang="en-US"/>
           </a:p>
@@ -1618,7 +1621,7 @@
           <a:p>
             <a:fld id="{D865CB24-D727-4CC3-94C1-E7095621080B}" type="datetimeFigureOut">
               <a:rPr lang="en-US" smtClean="0"/>
-              <a:t>8/8/2024</a:t>
+              <a:t>8/10/2024</a:t>
             </a:fld>
             <a:endParaRPr lang="en-US"/>
           </a:p>
@@ -2030,7 +2033,7 @@
           <a:p>
             <a:fld id="{D865CB24-D727-4CC3-94C1-E7095621080B}" type="datetimeFigureOut">
               <a:rPr lang="en-US" smtClean="0"/>
-              <a:t>8/8/2024</a:t>
+              <a:t>8/10/2024</a:t>
             </a:fld>
             <a:endParaRPr lang="en-US"/>
           </a:p>
@@ -2171,7 +2174,7 @@
           <a:p>
             <a:fld id="{D865CB24-D727-4CC3-94C1-E7095621080B}" type="datetimeFigureOut">
               <a:rPr lang="en-US" smtClean="0"/>
-              <a:t>8/8/2024</a:t>
+              <a:t>8/10/2024</a:t>
             </a:fld>
             <a:endParaRPr lang="en-US"/>
           </a:p>
@@ -2284,7 +2287,7 @@
           <a:p>
             <a:fld id="{D865CB24-D727-4CC3-94C1-E7095621080B}" type="datetimeFigureOut">
               <a:rPr lang="en-US" smtClean="0"/>
-              <a:t>8/8/2024</a:t>
+              <a:t>8/10/2024</a:t>
             </a:fld>
             <a:endParaRPr lang="en-US"/>
           </a:p>
@@ -2595,7 +2598,7 @@
           <a:p>
             <a:fld id="{D865CB24-D727-4CC3-94C1-E7095621080B}" type="datetimeFigureOut">
               <a:rPr lang="en-US" smtClean="0"/>
-              <a:t>8/8/2024</a:t>
+              <a:t>8/10/2024</a:t>
             </a:fld>
             <a:endParaRPr lang="en-US"/>
           </a:p>
@@ -2883,7 +2886,7 @@
           <a:p>
             <a:fld id="{D865CB24-D727-4CC3-94C1-E7095621080B}" type="datetimeFigureOut">
               <a:rPr lang="en-US" smtClean="0"/>
-              <a:t>8/8/2024</a:t>
+              <a:t>8/10/2024</a:t>
             </a:fld>
             <a:endParaRPr lang="en-US"/>
           </a:p>
@@ -3124,7 +3127,7 @@
           <a:p>
             <a:fld id="{D865CB24-D727-4CC3-94C1-E7095621080B}" type="datetimeFigureOut">
               <a:rPr lang="en-US" smtClean="0"/>
-              <a:t>8/8/2024</a:t>
+              <a:t>8/10/2024</a:t>
             </a:fld>
             <a:endParaRPr lang="en-US"/>
           </a:p>
@@ -4643,6 +4646,185 @@
     <p:extLst>
       <p:ext uri="{BB962C8B-B14F-4D97-AF65-F5344CB8AC3E}">
         <p14:creationId xmlns:p14="http://schemas.microsoft.com/office/powerpoint/2010/main" val="3615632765"/>
+      </p:ext>
+    </p:extLst>
+  </p:cSld>
+  <p:clrMapOvr>
+    <a:masterClrMapping/>
+  </p:clrMapOvr>
+</p:sld>
+</file>
+
+<file path=ppt/slides/slide7.xml><?xml version="1.0" encoding="utf-8"?>
+<p:sld xmlns:a="http://schemas.openxmlformats.org/drawingml/2006/main" xmlns:r="http://schemas.openxmlformats.org/officeDocument/2006/relationships" xmlns:p="http://schemas.openxmlformats.org/presentationml/2006/main">
+  <p:cSld>
+    <p:spTree>
+      <p:nvGrpSpPr>
+        <p:cNvPr id="1" name=""/>
+        <p:cNvGrpSpPr/>
+        <p:nvPr/>
+      </p:nvGrpSpPr>
+      <p:grpSpPr>
+        <a:xfrm>
+          <a:off x="0" y="0"/>
+          <a:ext cx="0" cy="0"/>
+          <a:chOff x="0" y="0"/>
+          <a:chExt cx="0" cy="0"/>
+        </a:xfrm>
+      </p:grpSpPr>
+      <p:pic>
+        <p:nvPicPr>
+          <p:cNvPr id="5" name="Picture 4">
+            <a:extLst>
+              <a:ext uri="{FF2B5EF4-FFF2-40B4-BE49-F238E27FC236}">
+                <a16:creationId xmlns:a16="http://schemas.microsoft.com/office/drawing/2014/main" id="{C95CF9A1-A119-671C-7D26-B75B84EE61E8}"/>
+              </a:ext>
+            </a:extLst>
+          </p:cNvPr>
+          <p:cNvPicPr>
+            <a:picLocks noChangeAspect="1"/>
+          </p:cNvPicPr>
+          <p:nvPr/>
+        </p:nvPicPr>
+        <p:blipFill>
+          <a:blip r:embed="rId2"/>
+          <a:stretch>
+            <a:fillRect/>
+          </a:stretch>
+        </p:blipFill>
+        <p:spPr>
+          <a:xfrm>
+            <a:off x="1734703" y="40341"/>
+            <a:ext cx="8722593" cy="6817659"/>
+          </a:xfrm>
+          <a:prstGeom prst="rect">
+            <a:avLst/>
+          </a:prstGeom>
+        </p:spPr>
+      </p:pic>
+    </p:spTree>
+    <p:extLst>
+      <p:ext uri="{BB962C8B-B14F-4D97-AF65-F5344CB8AC3E}">
+        <p14:creationId xmlns:p14="http://schemas.microsoft.com/office/powerpoint/2010/main" val="2839496473"/>
+      </p:ext>
+    </p:extLst>
+  </p:cSld>
+  <p:clrMapOvr>
+    <a:masterClrMapping/>
+  </p:clrMapOvr>
+</p:sld>
+</file>
+
+<file path=ppt/slides/slide8.xml><?xml version="1.0" encoding="utf-8"?>
+<p:sld xmlns:a="http://schemas.openxmlformats.org/drawingml/2006/main" xmlns:r="http://schemas.openxmlformats.org/officeDocument/2006/relationships" xmlns:p="http://schemas.openxmlformats.org/presentationml/2006/main">
+  <p:cSld>
+    <p:spTree>
+      <p:nvGrpSpPr>
+        <p:cNvPr id="1" name=""/>
+        <p:cNvGrpSpPr/>
+        <p:nvPr/>
+      </p:nvGrpSpPr>
+      <p:grpSpPr>
+        <a:xfrm>
+          <a:off x="0" y="0"/>
+          <a:ext cx="0" cy="0"/>
+          <a:chOff x="0" y="0"/>
+          <a:chExt cx="0" cy="0"/>
+        </a:xfrm>
+      </p:grpSpPr>
+      <p:pic>
+        <p:nvPicPr>
+          <p:cNvPr id="5" name="Picture 4">
+            <a:extLst>
+              <a:ext uri="{FF2B5EF4-FFF2-40B4-BE49-F238E27FC236}">
+                <a16:creationId xmlns:a16="http://schemas.microsoft.com/office/drawing/2014/main" id="{E6D4D74D-9DA9-ACDF-1DFE-12408BDA5AA5}"/>
+              </a:ext>
+            </a:extLst>
+          </p:cNvPr>
+          <p:cNvPicPr>
+            <a:picLocks noChangeAspect="1"/>
+          </p:cNvPicPr>
+          <p:nvPr/>
+        </p:nvPicPr>
+        <p:blipFill>
+          <a:blip r:embed="rId2"/>
+          <a:stretch>
+            <a:fillRect/>
+          </a:stretch>
+        </p:blipFill>
+        <p:spPr>
+          <a:xfrm>
+            <a:off x="1710612" y="16123"/>
+            <a:ext cx="8770776" cy="6825754"/>
+          </a:xfrm>
+          <a:prstGeom prst="rect">
+            <a:avLst/>
+          </a:prstGeom>
+        </p:spPr>
+      </p:pic>
+    </p:spTree>
+    <p:extLst>
+      <p:ext uri="{BB962C8B-B14F-4D97-AF65-F5344CB8AC3E}">
+        <p14:creationId xmlns:p14="http://schemas.microsoft.com/office/powerpoint/2010/main" val="3943996621"/>
+      </p:ext>
+    </p:extLst>
+  </p:cSld>
+  <p:clrMapOvr>
+    <a:masterClrMapping/>
+  </p:clrMapOvr>
+</p:sld>
+</file>
+
+<file path=ppt/slides/slide9.xml><?xml version="1.0" encoding="utf-8"?>
+<p:sld xmlns:a="http://schemas.openxmlformats.org/drawingml/2006/main" xmlns:r="http://schemas.openxmlformats.org/officeDocument/2006/relationships" xmlns:p="http://schemas.openxmlformats.org/presentationml/2006/main">
+  <p:cSld>
+    <p:spTree>
+      <p:nvGrpSpPr>
+        <p:cNvPr id="1" name=""/>
+        <p:cNvGrpSpPr/>
+        <p:nvPr/>
+      </p:nvGrpSpPr>
+      <p:grpSpPr>
+        <a:xfrm>
+          <a:off x="0" y="0"/>
+          <a:ext cx="0" cy="0"/>
+          <a:chOff x="0" y="0"/>
+          <a:chExt cx="0" cy="0"/>
+        </a:xfrm>
+      </p:grpSpPr>
+      <p:pic>
+        <p:nvPicPr>
+          <p:cNvPr id="5" name="Picture 4">
+            <a:extLst>
+              <a:ext uri="{FF2B5EF4-FFF2-40B4-BE49-F238E27FC236}">
+                <a16:creationId xmlns:a16="http://schemas.microsoft.com/office/drawing/2014/main" id="{59340A09-0EAF-EF48-B650-22B5E77B8561}"/>
+              </a:ext>
+            </a:extLst>
+          </p:cNvPr>
+          <p:cNvPicPr>
+            <a:picLocks noChangeAspect="1"/>
+          </p:cNvPicPr>
+          <p:nvPr/>
+        </p:nvPicPr>
+        <p:blipFill rotWithShape="1">
+          <a:blip r:embed="rId2"/>
+          <a:srcRect r="3977"/>
+          <a:stretch/>
+        </p:blipFill>
+        <p:spPr>
+          <a:xfrm>
+            <a:off x="1719025" y="0"/>
+            <a:ext cx="8753949" cy="6858000"/>
+          </a:xfrm>
+          <a:prstGeom prst="rect">
+            <a:avLst/>
+          </a:prstGeom>
+        </p:spPr>
+      </p:pic>
+    </p:spTree>
+    <p:extLst>
+      <p:ext uri="{BB962C8B-B14F-4D97-AF65-F5344CB8AC3E}">
+        <p14:creationId xmlns:p14="http://schemas.microsoft.com/office/powerpoint/2010/main" val="3355725141"/>
       </p:ext>
     </p:extLst>
   </p:cSld>

</xml_diff>

<commit_message>
Update Powerpoint with goeanalysis files
</commit_message>
<xml_diff>
--- a/Project 1 Slides - Smith.pptx
+++ b/Project 1 Slides - Smith.pptx
@@ -11,9 +11,11 @@
     <p:sldId id="259" r:id="rId5"/>
     <p:sldId id="260" r:id="rId6"/>
     <p:sldId id="261" r:id="rId7"/>
-    <p:sldId id="263" r:id="rId8"/>
-    <p:sldId id="264" r:id="rId9"/>
-    <p:sldId id="262" r:id="rId10"/>
+    <p:sldId id="262" r:id="rId8"/>
+    <p:sldId id="263" r:id="rId9"/>
+    <p:sldId id="264" r:id="rId10"/>
+    <p:sldId id="266" r:id="rId11"/>
+    <p:sldId id="267" r:id="rId12"/>
   </p:sldIdLst>
   <p:sldSz cx="12192000" cy="6858000"/>
   <p:notesSz cx="6858000" cy="9144000"/>
@@ -3658,6 +3660,126 @@
 </p:sld>
 </file>
 
+<file path=ppt/slides/slide10.xml><?xml version="1.0" encoding="utf-8"?>
+<p:sld xmlns:a="http://schemas.openxmlformats.org/drawingml/2006/main" xmlns:r="http://schemas.openxmlformats.org/officeDocument/2006/relationships" xmlns:p="http://schemas.openxmlformats.org/presentationml/2006/main">
+  <p:cSld>
+    <p:spTree>
+      <p:nvGrpSpPr>
+        <p:cNvPr id="1" name=""/>
+        <p:cNvGrpSpPr/>
+        <p:nvPr/>
+      </p:nvGrpSpPr>
+      <p:grpSpPr>
+        <a:xfrm>
+          <a:off x="0" y="0"/>
+          <a:ext cx="0" cy="0"/>
+          <a:chOff x="0" y="0"/>
+          <a:chExt cx="0" cy="0"/>
+        </a:xfrm>
+      </p:grpSpPr>
+      <p:pic>
+        <p:nvPicPr>
+          <p:cNvPr id="5" name="Picture 4">
+            <a:extLst>
+              <a:ext uri="{FF2B5EF4-FFF2-40B4-BE49-F238E27FC236}">
+                <a16:creationId xmlns:a16="http://schemas.microsoft.com/office/drawing/2014/main" id="{12595115-FCF6-0849-DBEE-5217C1FE3C1F}"/>
+              </a:ext>
+            </a:extLst>
+          </p:cNvPr>
+          <p:cNvPicPr>
+            <a:picLocks noChangeAspect="1"/>
+          </p:cNvPicPr>
+          <p:nvPr/>
+        </p:nvPicPr>
+        <p:blipFill>
+          <a:blip r:embed="rId2"/>
+          <a:stretch>
+            <a:fillRect/>
+          </a:stretch>
+        </p:blipFill>
+        <p:spPr>
+          <a:xfrm>
+            <a:off x="0" y="-1"/>
+            <a:ext cx="12111135" cy="6878697"/>
+          </a:xfrm>
+          <a:prstGeom prst="rect">
+            <a:avLst/>
+          </a:prstGeom>
+        </p:spPr>
+      </p:pic>
+    </p:spTree>
+    <p:extLst>
+      <p:ext uri="{BB962C8B-B14F-4D97-AF65-F5344CB8AC3E}">
+        <p14:creationId xmlns:p14="http://schemas.microsoft.com/office/powerpoint/2010/main" val="839968429"/>
+      </p:ext>
+    </p:extLst>
+  </p:cSld>
+  <p:clrMapOvr>
+    <a:masterClrMapping/>
+  </p:clrMapOvr>
+</p:sld>
+</file>
+
+<file path=ppt/slides/slide11.xml><?xml version="1.0" encoding="utf-8"?>
+<p:sld xmlns:a="http://schemas.openxmlformats.org/drawingml/2006/main" xmlns:r="http://schemas.openxmlformats.org/officeDocument/2006/relationships" xmlns:p="http://schemas.openxmlformats.org/presentationml/2006/main">
+  <p:cSld>
+    <p:spTree>
+      <p:nvGrpSpPr>
+        <p:cNvPr id="1" name=""/>
+        <p:cNvGrpSpPr/>
+        <p:nvPr/>
+      </p:nvGrpSpPr>
+      <p:grpSpPr>
+        <a:xfrm>
+          <a:off x="0" y="0"/>
+          <a:ext cx="0" cy="0"/>
+          <a:chOff x="0" y="0"/>
+          <a:chExt cx="0" cy="0"/>
+        </a:xfrm>
+      </p:grpSpPr>
+      <p:pic>
+        <p:nvPicPr>
+          <p:cNvPr id="5" name="Picture 4">
+            <a:extLst>
+              <a:ext uri="{FF2B5EF4-FFF2-40B4-BE49-F238E27FC236}">
+                <a16:creationId xmlns:a16="http://schemas.microsoft.com/office/drawing/2014/main" id="{8215F437-4558-1EB1-3CF5-A1A32C2F4702}"/>
+              </a:ext>
+            </a:extLst>
+          </p:cNvPr>
+          <p:cNvPicPr>
+            <a:picLocks noChangeAspect="1"/>
+          </p:cNvPicPr>
+          <p:nvPr/>
+        </p:nvPicPr>
+        <p:blipFill>
+          <a:blip r:embed="rId2"/>
+          <a:stretch>
+            <a:fillRect/>
+          </a:stretch>
+        </p:blipFill>
+        <p:spPr>
+          <a:xfrm>
+            <a:off x="0" y="0"/>
+            <a:ext cx="12012533" cy="6858000"/>
+          </a:xfrm>
+          <a:prstGeom prst="rect">
+            <a:avLst/>
+          </a:prstGeom>
+        </p:spPr>
+      </p:pic>
+    </p:spTree>
+    <p:extLst>
+      <p:ext uri="{BB962C8B-B14F-4D97-AF65-F5344CB8AC3E}">
+        <p14:creationId xmlns:p14="http://schemas.microsoft.com/office/powerpoint/2010/main" val="3903713876"/>
+      </p:ext>
+    </p:extLst>
+  </p:cSld>
+  <p:clrMapOvr>
+    <a:masterClrMapping/>
+  </p:clrMapOvr>
+</p:sld>
+</file>
+
 <file path=ppt/slides/slide2.xml><?xml version="1.0" encoding="utf-8"?>
 <p:sld xmlns:a="http://schemas.openxmlformats.org/drawingml/2006/main" xmlns:r="http://schemas.openxmlformats.org/officeDocument/2006/relationships" xmlns:p="http://schemas.openxmlformats.org/presentationml/2006/main">
   <p:cSld>
@@ -4677,7 +4799,7 @@
           <p:cNvPr id="5" name="Picture 4">
             <a:extLst>
               <a:ext uri="{FF2B5EF4-FFF2-40B4-BE49-F238E27FC236}">
-                <a16:creationId xmlns:a16="http://schemas.microsoft.com/office/drawing/2014/main" id="{C95CF9A1-A119-671C-7D26-B75B84EE61E8}"/>
+                <a16:creationId xmlns:a16="http://schemas.microsoft.com/office/drawing/2014/main" id="{B63360D9-B1EF-88F3-FEA8-005E39272152}"/>
               </a:ext>
             </a:extLst>
           </p:cNvPr>
@@ -4694,8 +4816,8 @@
         </p:blipFill>
         <p:spPr>
           <a:xfrm>
-            <a:off x="1734703" y="40341"/>
-            <a:ext cx="8722593" cy="6817659"/>
+            <a:off x="0" y="0"/>
+            <a:ext cx="12027159" cy="6861309"/>
           </a:xfrm>
           <a:prstGeom prst="rect">
             <a:avLst/>
@@ -4705,7 +4827,7 @@
     </p:spTree>
     <p:extLst>
       <p:ext uri="{BB962C8B-B14F-4D97-AF65-F5344CB8AC3E}">
-        <p14:creationId xmlns:p14="http://schemas.microsoft.com/office/powerpoint/2010/main" val="2839496473"/>
+        <p14:creationId xmlns:p14="http://schemas.microsoft.com/office/powerpoint/2010/main" val="3778779866"/>
       </p:ext>
     </p:extLst>
   </p:cSld>
@@ -4734,10 +4856,10 @@
       </p:grpSpPr>
       <p:pic>
         <p:nvPicPr>
-          <p:cNvPr id="5" name="Picture 4">
-            <a:extLst>
-              <a:ext uri="{FF2B5EF4-FFF2-40B4-BE49-F238E27FC236}">
-                <a16:creationId xmlns:a16="http://schemas.microsoft.com/office/drawing/2014/main" id="{E6D4D74D-9DA9-ACDF-1DFE-12408BDA5AA5}"/>
+          <p:cNvPr id="9" name="Picture 8">
+            <a:extLst>
+              <a:ext uri="{FF2B5EF4-FFF2-40B4-BE49-F238E27FC236}">
+                <a16:creationId xmlns:a16="http://schemas.microsoft.com/office/drawing/2014/main" id="{B79C9796-A5E5-E95D-3363-5E78FF644BE2}"/>
               </a:ext>
             </a:extLst>
           </p:cNvPr>
@@ -4746,16 +4868,15 @@
           </p:cNvPicPr>
           <p:nvPr/>
         </p:nvPicPr>
-        <p:blipFill>
+        <p:blipFill rotWithShape="1">
           <a:blip r:embed="rId2"/>
-          <a:stretch>
-            <a:fillRect/>
-          </a:stretch>
+          <a:srcRect r="462"/>
+          <a:stretch/>
         </p:blipFill>
         <p:spPr>
           <a:xfrm>
-            <a:off x="1710612" y="16123"/>
-            <a:ext cx="8770776" cy="6825754"/>
+            <a:off x="63758" y="21392"/>
+            <a:ext cx="12064483" cy="6815215"/>
           </a:xfrm>
           <a:prstGeom prst="rect">
             <a:avLst/>
@@ -4765,7 +4886,7 @@
     </p:spTree>
     <p:extLst>
       <p:ext uri="{BB962C8B-B14F-4D97-AF65-F5344CB8AC3E}">
-        <p14:creationId xmlns:p14="http://schemas.microsoft.com/office/powerpoint/2010/main" val="3943996621"/>
+        <p14:creationId xmlns:p14="http://schemas.microsoft.com/office/powerpoint/2010/main" val="2354817699"/>
       </p:ext>
     </p:extLst>
   </p:cSld>
@@ -4797,7 +4918,7 @@
           <p:cNvPr id="5" name="Picture 4">
             <a:extLst>
               <a:ext uri="{FF2B5EF4-FFF2-40B4-BE49-F238E27FC236}">
-                <a16:creationId xmlns:a16="http://schemas.microsoft.com/office/drawing/2014/main" id="{59340A09-0EAF-EF48-B650-22B5E77B8561}"/>
+                <a16:creationId xmlns:a16="http://schemas.microsoft.com/office/drawing/2014/main" id="{76106D4A-1B74-B960-77B5-8AD7C217315C}"/>
               </a:ext>
             </a:extLst>
           </p:cNvPr>
@@ -4806,15 +4927,16 @@
           </p:cNvPicPr>
           <p:nvPr/>
         </p:nvPicPr>
-        <p:blipFill rotWithShape="1">
+        <p:blipFill>
           <a:blip r:embed="rId2"/>
-          <a:srcRect r="3977"/>
-          <a:stretch/>
+          <a:stretch>
+            <a:fillRect/>
+          </a:stretch>
         </p:blipFill>
         <p:spPr>
           <a:xfrm>
-            <a:off x="1719025" y="0"/>
-            <a:ext cx="8753949" cy="6858000"/>
+            <a:off x="0" y="0"/>
+            <a:ext cx="11980506" cy="6866124"/>
           </a:xfrm>
           <a:prstGeom prst="rect">
             <a:avLst/>
@@ -4824,7 +4946,7 @@
     </p:spTree>
     <p:extLst>
       <p:ext uri="{BB962C8B-B14F-4D97-AF65-F5344CB8AC3E}">
-        <p14:creationId xmlns:p14="http://schemas.microsoft.com/office/powerpoint/2010/main" val="3355725141"/>
+        <p14:creationId xmlns:p14="http://schemas.microsoft.com/office/powerpoint/2010/main" val="3457000223"/>
       </p:ext>
     </p:extLst>
   </p:cSld>

</xml_diff>

<commit_message>
Pushing geoanalysis update to team powerpoint
</commit_message>
<xml_diff>
--- a/Project 1 Slides - Smith.pptx
+++ b/Project 1 Slides - Smith.pptx
@@ -14,8 +14,11 @@
     <p:sldId id="262" r:id="rId8"/>
     <p:sldId id="263" r:id="rId9"/>
     <p:sldId id="264" r:id="rId10"/>
-    <p:sldId id="266" r:id="rId11"/>
-    <p:sldId id="267" r:id="rId12"/>
+    <p:sldId id="265" r:id="rId11"/>
+    <p:sldId id="266" r:id="rId12"/>
+    <p:sldId id="267" r:id="rId13"/>
+    <p:sldId id="268" r:id="rId14"/>
+    <p:sldId id="269" r:id="rId15"/>
   </p:sldIdLst>
   <p:sldSz cx="12192000" cy="6858000"/>
   <p:notesSz cx="6858000" cy="9144000"/>
@@ -479,7 +482,7 @@
           <a:p>
             <a:fld id="{D865CB24-D727-4CC3-94C1-E7095621080B}" type="datetimeFigureOut">
               <a:rPr lang="en-US" smtClean="0"/>
-              <a:t>8/10/2024</a:t>
+              <a:t>8/11/2024</a:t>
             </a:fld>
             <a:endParaRPr lang="en-US"/>
           </a:p>
@@ -677,7 +680,7 @@
           <a:p>
             <a:fld id="{D865CB24-D727-4CC3-94C1-E7095621080B}" type="datetimeFigureOut">
               <a:rPr lang="en-US" smtClean="0"/>
-              <a:t>8/10/2024</a:t>
+              <a:t>8/11/2024</a:t>
             </a:fld>
             <a:endParaRPr lang="en-US"/>
           </a:p>
@@ -885,7 +888,7 @@
           <a:p>
             <a:fld id="{D865CB24-D727-4CC3-94C1-E7095621080B}" type="datetimeFigureOut">
               <a:rPr lang="en-US" smtClean="0"/>
-              <a:t>8/10/2024</a:t>
+              <a:t>8/11/2024</a:t>
             </a:fld>
             <a:endParaRPr lang="en-US"/>
           </a:p>
@@ -1083,7 +1086,7 @@
           <a:p>
             <a:fld id="{D865CB24-D727-4CC3-94C1-E7095621080B}" type="datetimeFigureOut">
               <a:rPr lang="en-US" smtClean="0"/>
-              <a:t>8/10/2024</a:t>
+              <a:t>8/11/2024</a:t>
             </a:fld>
             <a:endParaRPr lang="en-US"/>
           </a:p>
@@ -1358,7 +1361,7 @@
           <a:p>
             <a:fld id="{D865CB24-D727-4CC3-94C1-E7095621080B}" type="datetimeFigureOut">
               <a:rPr lang="en-US" smtClean="0"/>
-              <a:t>8/10/2024</a:t>
+              <a:t>8/11/2024</a:t>
             </a:fld>
             <a:endParaRPr lang="en-US"/>
           </a:p>
@@ -1623,7 +1626,7 @@
           <a:p>
             <a:fld id="{D865CB24-D727-4CC3-94C1-E7095621080B}" type="datetimeFigureOut">
               <a:rPr lang="en-US" smtClean="0"/>
-              <a:t>8/10/2024</a:t>
+              <a:t>8/11/2024</a:t>
             </a:fld>
             <a:endParaRPr lang="en-US"/>
           </a:p>
@@ -2035,7 +2038,7 @@
           <a:p>
             <a:fld id="{D865CB24-D727-4CC3-94C1-E7095621080B}" type="datetimeFigureOut">
               <a:rPr lang="en-US" smtClean="0"/>
-              <a:t>8/10/2024</a:t>
+              <a:t>8/11/2024</a:t>
             </a:fld>
             <a:endParaRPr lang="en-US"/>
           </a:p>
@@ -2176,7 +2179,7 @@
           <a:p>
             <a:fld id="{D865CB24-D727-4CC3-94C1-E7095621080B}" type="datetimeFigureOut">
               <a:rPr lang="en-US" smtClean="0"/>
-              <a:t>8/10/2024</a:t>
+              <a:t>8/11/2024</a:t>
             </a:fld>
             <a:endParaRPr lang="en-US"/>
           </a:p>
@@ -2289,7 +2292,7 @@
           <a:p>
             <a:fld id="{D865CB24-D727-4CC3-94C1-E7095621080B}" type="datetimeFigureOut">
               <a:rPr lang="en-US" smtClean="0"/>
-              <a:t>8/10/2024</a:t>
+              <a:t>8/11/2024</a:t>
             </a:fld>
             <a:endParaRPr lang="en-US"/>
           </a:p>
@@ -2600,7 +2603,7 @@
           <a:p>
             <a:fld id="{D865CB24-D727-4CC3-94C1-E7095621080B}" type="datetimeFigureOut">
               <a:rPr lang="en-US" smtClean="0"/>
-              <a:t>8/10/2024</a:t>
+              <a:t>8/11/2024</a:t>
             </a:fld>
             <a:endParaRPr lang="en-US"/>
           </a:p>
@@ -2888,7 +2891,7 @@
           <a:p>
             <a:fld id="{D865CB24-D727-4CC3-94C1-E7095621080B}" type="datetimeFigureOut">
               <a:rPr lang="en-US" smtClean="0"/>
-              <a:t>8/10/2024</a:t>
+              <a:t>8/11/2024</a:t>
             </a:fld>
             <a:endParaRPr lang="en-US"/>
           </a:p>
@@ -3129,7 +3132,7 @@
           <a:p>
             <a:fld id="{D865CB24-D727-4CC3-94C1-E7095621080B}" type="datetimeFigureOut">
               <a:rPr lang="en-US" smtClean="0"/>
-              <a:t>8/10/2024</a:t>
+              <a:t>8/11/2024</a:t>
             </a:fld>
             <a:endParaRPr lang="en-US"/>
           </a:p>
@@ -3682,7 +3685,7 @@
           <p:cNvPr id="5" name="Picture 4">
             <a:extLst>
               <a:ext uri="{FF2B5EF4-FFF2-40B4-BE49-F238E27FC236}">
-                <a16:creationId xmlns:a16="http://schemas.microsoft.com/office/drawing/2014/main" id="{12595115-FCF6-0849-DBEE-5217C1FE3C1F}"/>
+                <a16:creationId xmlns:a16="http://schemas.microsoft.com/office/drawing/2014/main" id="{E71A84CA-42E3-A3E6-139C-690D56997A86}"/>
               </a:ext>
             </a:extLst>
           </p:cNvPr>
@@ -3699,8 +3702,8 @@
         </p:blipFill>
         <p:spPr>
           <a:xfrm>
-            <a:off x="0" y="-1"/>
-            <a:ext cx="12111135" cy="6878697"/>
+            <a:off x="0" y="0"/>
+            <a:ext cx="11975123" cy="6858000"/>
           </a:xfrm>
           <a:prstGeom prst="rect">
             <a:avLst/>
@@ -3710,7 +3713,7 @@
     </p:spTree>
     <p:extLst>
       <p:ext uri="{BB962C8B-B14F-4D97-AF65-F5344CB8AC3E}">
-        <p14:creationId xmlns:p14="http://schemas.microsoft.com/office/powerpoint/2010/main" val="839968429"/>
+        <p14:creationId xmlns:p14="http://schemas.microsoft.com/office/powerpoint/2010/main" val="3815287690"/>
       </p:ext>
     </p:extLst>
   </p:cSld>
@@ -3742,6 +3745,66 @@
           <p:cNvPr id="5" name="Picture 4">
             <a:extLst>
               <a:ext uri="{FF2B5EF4-FFF2-40B4-BE49-F238E27FC236}">
+                <a16:creationId xmlns:a16="http://schemas.microsoft.com/office/drawing/2014/main" id="{6990D4A5-6DE4-E6E6-FA47-3B6B0BAC1B6F}"/>
+              </a:ext>
+            </a:extLst>
+          </p:cNvPr>
+          <p:cNvPicPr>
+            <a:picLocks noChangeAspect="1"/>
+          </p:cNvPicPr>
+          <p:nvPr/>
+        </p:nvPicPr>
+        <p:blipFill>
+          <a:blip r:embed="rId2"/>
+          <a:stretch>
+            <a:fillRect/>
+          </a:stretch>
+        </p:blipFill>
+        <p:spPr>
+          <a:xfrm>
+            <a:off x="0" y="0"/>
+            <a:ext cx="12021359" cy="6858000"/>
+          </a:xfrm>
+          <a:prstGeom prst="rect">
+            <a:avLst/>
+          </a:prstGeom>
+        </p:spPr>
+      </p:pic>
+    </p:spTree>
+    <p:extLst>
+      <p:ext uri="{BB962C8B-B14F-4D97-AF65-F5344CB8AC3E}">
+        <p14:creationId xmlns:p14="http://schemas.microsoft.com/office/powerpoint/2010/main" val="181461678"/>
+      </p:ext>
+    </p:extLst>
+  </p:cSld>
+  <p:clrMapOvr>
+    <a:masterClrMapping/>
+  </p:clrMapOvr>
+</p:sld>
+</file>
+
+<file path=ppt/slides/slide12.xml><?xml version="1.0" encoding="utf-8"?>
+<p:sld xmlns:a="http://schemas.openxmlformats.org/drawingml/2006/main" xmlns:r="http://schemas.openxmlformats.org/officeDocument/2006/relationships" xmlns:p="http://schemas.openxmlformats.org/presentationml/2006/main">
+  <p:cSld>
+    <p:spTree>
+      <p:nvGrpSpPr>
+        <p:cNvPr id="1" name=""/>
+        <p:cNvGrpSpPr/>
+        <p:nvPr/>
+      </p:nvGrpSpPr>
+      <p:grpSpPr>
+        <a:xfrm>
+          <a:off x="0" y="0"/>
+          <a:ext cx="0" cy="0"/>
+          <a:chOff x="0" y="0"/>
+          <a:chExt cx="0" cy="0"/>
+        </a:xfrm>
+      </p:grpSpPr>
+      <p:pic>
+        <p:nvPicPr>
+          <p:cNvPr id="5" name="Picture 4">
+            <a:extLst>
+              <a:ext uri="{FF2B5EF4-FFF2-40B4-BE49-F238E27FC236}">
                 <a16:creationId xmlns:a16="http://schemas.microsoft.com/office/drawing/2014/main" id="{8215F437-4558-1EB1-3CF5-A1A32C2F4702}"/>
               </a:ext>
             </a:extLst>
@@ -3771,6 +3834,126 @@
     <p:extLst>
       <p:ext uri="{BB962C8B-B14F-4D97-AF65-F5344CB8AC3E}">
         <p14:creationId xmlns:p14="http://schemas.microsoft.com/office/powerpoint/2010/main" val="3903713876"/>
+      </p:ext>
+    </p:extLst>
+  </p:cSld>
+  <p:clrMapOvr>
+    <a:masterClrMapping/>
+  </p:clrMapOvr>
+</p:sld>
+</file>
+
+<file path=ppt/slides/slide13.xml><?xml version="1.0" encoding="utf-8"?>
+<p:sld xmlns:a="http://schemas.openxmlformats.org/drawingml/2006/main" xmlns:r="http://schemas.openxmlformats.org/officeDocument/2006/relationships" xmlns:p="http://schemas.openxmlformats.org/presentationml/2006/main">
+  <p:cSld>
+    <p:spTree>
+      <p:nvGrpSpPr>
+        <p:cNvPr id="1" name=""/>
+        <p:cNvGrpSpPr/>
+        <p:nvPr/>
+      </p:nvGrpSpPr>
+      <p:grpSpPr>
+        <a:xfrm>
+          <a:off x="0" y="0"/>
+          <a:ext cx="0" cy="0"/>
+          <a:chOff x="0" y="0"/>
+          <a:chExt cx="0" cy="0"/>
+        </a:xfrm>
+      </p:grpSpPr>
+      <p:pic>
+        <p:nvPicPr>
+          <p:cNvPr id="5" name="Picture 4">
+            <a:extLst>
+              <a:ext uri="{FF2B5EF4-FFF2-40B4-BE49-F238E27FC236}">
+                <a16:creationId xmlns:a16="http://schemas.microsoft.com/office/drawing/2014/main" id="{B9C68FD9-95C0-642A-7E07-592F881F6136}"/>
+              </a:ext>
+            </a:extLst>
+          </p:cNvPr>
+          <p:cNvPicPr>
+            <a:picLocks noChangeAspect="1"/>
+          </p:cNvPicPr>
+          <p:nvPr/>
+        </p:nvPicPr>
+        <p:blipFill>
+          <a:blip r:embed="rId2"/>
+          <a:stretch>
+            <a:fillRect/>
+          </a:stretch>
+        </p:blipFill>
+        <p:spPr>
+          <a:xfrm>
+            <a:off x="0" y="-1"/>
+            <a:ext cx="11915192" cy="6861325"/>
+          </a:xfrm>
+          <a:prstGeom prst="rect">
+            <a:avLst/>
+          </a:prstGeom>
+        </p:spPr>
+      </p:pic>
+    </p:spTree>
+    <p:extLst>
+      <p:ext uri="{BB962C8B-B14F-4D97-AF65-F5344CB8AC3E}">
+        <p14:creationId xmlns:p14="http://schemas.microsoft.com/office/powerpoint/2010/main" val="2583778888"/>
+      </p:ext>
+    </p:extLst>
+  </p:cSld>
+  <p:clrMapOvr>
+    <a:masterClrMapping/>
+  </p:clrMapOvr>
+</p:sld>
+</file>
+
+<file path=ppt/slides/slide14.xml><?xml version="1.0" encoding="utf-8"?>
+<p:sld xmlns:a="http://schemas.openxmlformats.org/drawingml/2006/main" xmlns:r="http://schemas.openxmlformats.org/officeDocument/2006/relationships" xmlns:p="http://schemas.openxmlformats.org/presentationml/2006/main">
+  <p:cSld>
+    <p:spTree>
+      <p:nvGrpSpPr>
+        <p:cNvPr id="1" name=""/>
+        <p:cNvGrpSpPr/>
+        <p:nvPr/>
+      </p:nvGrpSpPr>
+      <p:grpSpPr>
+        <a:xfrm>
+          <a:off x="0" y="0"/>
+          <a:ext cx="0" cy="0"/>
+          <a:chOff x="0" y="0"/>
+          <a:chExt cx="0" cy="0"/>
+        </a:xfrm>
+      </p:grpSpPr>
+      <p:pic>
+        <p:nvPicPr>
+          <p:cNvPr id="5" name="Picture 4">
+            <a:extLst>
+              <a:ext uri="{FF2B5EF4-FFF2-40B4-BE49-F238E27FC236}">
+                <a16:creationId xmlns:a16="http://schemas.microsoft.com/office/drawing/2014/main" id="{F5BDC3BF-689D-3CED-1813-9901DAFE7764}"/>
+              </a:ext>
+            </a:extLst>
+          </p:cNvPr>
+          <p:cNvPicPr>
+            <a:picLocks noChangeAspect="1"/>
+          </p:cNvPicPr>
+          <p:nvPr/>
+        </p:nvPicPr>
+        <p:blipFill>
+          <a:blip r:embed="rId2"/>
+          <a:stretch>
+            <a:fillRect/>
+          </a:stretch>
+        </p:blipFill>
+        <p:spPr>
+          <a:xfrm>
+            <a:off x="0" y="0"/>
+            <a:ext cx="11939954" cy="6858000"/>
+          </a:xfrm>
+          <a:prstGeom prst="rect">
+            <a:avLst/>
+          </a:prstGeom>
+        </p:spPr>
+      </p:pic>
+    </p:spTree>
+    <p:extLst>
+      <p:ext uri="{BB962C8B-B14F-4D97-AF65-F5344CB8AC3E}">
+        <p14:creationId xmlns:p14="http://schemas.microsoft.com/office/powerpoint/2010/main" val="1704283206"/>
       </p:ext>
     </p:extLst>
   </p:cSld>
@@ -4856,10 +5039,10 @@
       </p:grpSpPr>
       <p:pic>
         <p:nvPicPr>
-          <p:cNvPr id="9" name="Picture 8">
-            <a:extLst>
-              <a:ext uri="{FF2B5EF4-FFF2-40B4-BE49-F238E27FC236}">
-                <a16:creationId xmlns:a16="http://schemas.microsoft.com/office/drawing/2014/main" id="{B79C9796-A5E5-E95D-3363-5E78FF644BE2}"/>
+          <p:cNvPr id="5" name="Picture 4">
+            <a:extLst>
+              <a:ext uri="{FF2B5EF4-FFF2-40B4-BE49-F238E27FC236}">
+                <a16:creationId xmlns:a16="http://schemas.microsoft.com/office/drawing/2014/main" id="{8D8E251B-3991-FBB5-FCE2-3938811CBB79}"/>
               </a:ext>
             </a:extLst>
           </p:cNvPr>
@@ -4868,15 +5051,16 @@
           </p:cNvPicPr>
           <p:nvPr/>
         </p:nvPicPr>
-        <p:blipFill rotWithShape="1">
+        <p:blipFill>
           <a:blip r:embed="rId2"/>
-          <a:srcRect r="462"/>
-          <a:stretch/>
+          <a:stretch>
+            <a:fillRect/>
+          </a:stretch>
         </p:blipFill>
         <p:spPr>
           <a:xfrm>
-            <a:off x="63758" y="21392"/>
-            <a:ext cx="12064483" cy="6815215"/>
+            <a:off x="-1" y="0"/>
+            <a:ext cx="11972889" cy="6858000"/>
           </a:xfrm>
           <a:prstGeom prst="rect">
             <a:avLst/>
@@ -4886,7 +5070,7 @@
     </p:spTree>
     <p:extLst>
       <p:ext uri="{BB962C8B-B14F-4D97-AF65-F5344CB8AC3E}">
-        <p14:creationId xmlns:p14="http://schemas.microsoft.com/office/powerpoint/2010/main" val="2354817699"/>
+        <p14:creationId xmlns:p14="http://schemas.microsoft.com/office/powerpoint/2010/main" val="1028752856"/>
       </p:ext>
     </p:extLst>
   </p:cSld>

</xml_diff>

<commit_message>
Deleted Unecessary map slide in powerpoint
</commit_message>
<xml_diff>
--- a/Project 1 Slides - Smith.pptx
+++ b/Project 1 Slides - Smith.pptx
@@ -13,12 +13,11 @@
     <p:sldId id="261" r:id="rId7"/>
     <p:sldId id="262" r:id="rId8"/>
     <p:sldId id="263" r:id="rId9"/>
-    <p:sldId id="264" r:id="rId10"/>
-    <p:sldId id="265" r:id="rId11"/>
-    <p:sldId id="266" r:id="rId12"/>
-    <p:sldId id="267" r:id="rId13"/>
-    <p:sldId id="268" r:id="rId14"/>
-    <p:sldId id="269" r:id="rId15"/>
+    <p:sldId id="265" r:id="rId10"/>
+    <p:sldId id="266" r:id="rId11"/>
+    <p:sldId id="267" r:id="rId12"/>
+    <p:sldId id="268" r:id="rId13"/>
+    <p:sldId id="269" r:id="rId14"/>
   </p:sldIdLst>
   <p:sldSz cx="12192000" cy="6858000"/>
   <p:notesSz cx="6858000" cy="9144000"/>
@@ -3685,66 +3684,6 @@
           <p:cNvPr id="5" name="Picture 4">
             <a:extLst>
               <a:ext uri="{FF2B5EF4-FFF2-40B4-BE49-F238E27FC236}">
-                <a16:creationId xmlns:a16="http://schemas.microsoft.com/office/drawing/2014/main" id="{E71A84CA-42E3-A3E6-139C-690D56997A86}"/>
-              </a:ext>
-            </a:extLst>
-          </p:cNvPr>
-          <p:cNvPicPr>
-            <a:picLocks noChangeAspect="1"/>
-          </p:cNvPicPr>
-          <p:nvPr/>
-        </p:nvPicPr>
-        <p:blipFill>
-          <a:blip r:embed="rId2"/>
-          <a:stretch>
-            <a:fillRect/>
-          </a:stretch>
-        </p:blipFill>
-        <p:spPr>
-          <a:xfrm>
-            <a:off x="0" y="0"/>
-            <a:ext cx="11975123" cy="6858000"/>
-          </a:xfrm>
-          <a:prstGeom prst="rect">
-            <a:avLst/>
-          </a:prstGeom>
-        </p:spPr>
-      </p:pic>
-    </p:spTree>
-    <p:extLst>
-      <p:ext uri="{BB962C8B-B14F-4D97-AF65-F5344CB8AC3E}">
-        <p14:creationId xmlns:p14="http://schemas.microsoft.com/office/powerpoint/2010/main" val="3815287690"/>
-      </p:ext>
-    </p:extLst>
-  </p:cSld>
-  <p:clrMapOvr>
-    <a:masterClrMapping/>
-  </p:clrMapOvr>
-</p:sld>
-</file>
-
-<file path=ppt/slides/slide11.xml><?xml version="1.0" encoding="utf-8"?>
-<p:sld xmlns:a="http://schemas.openxmlformats.org/drawingml/2006/main" xmlns:r="http://schemas.openxmlformats.org/officeDocument/2006/relationships" xmlns:p="http://schemas.openxmlformats.org/presentationml/2006/main">
-  <p:cSld>
-    <p:spTree>
-      <p:nvGrpSpPr>
-        <p:cNvPr id="1" name=""/>
-        <p:cNvGrpSpPr/>
-        <p:nvPr/>
-      </p:nvGrpSpPr>
-      <p:grpSpPr>
-        <a:xfrm>
-          <a:off x="0" y="0"/>
-          <a:ext cx="0" cy="0"/>
-          <a:chOff x="0" y="0"/>
-          <a:chExt cx="0" cy="0"/>
-        </a:xfrm>
-      </p:grpSpPr>
-      <p:pic>
-        <p:nvPicPr>
-          <p:cNvPr id="5" name="Picture 4">
-            <a:extLst>
-              <a:ext uri="{FF2B5EF4-FFF2-40B4-BE49-F238E27FC236}">
                 <a16:creationId xmlns:a16="http://schemas.microsoft.com/office/drawing/2014/main" id="{6990D4A5-6DE4-E6E6-FA47-3B6B0BAC1B6F}"/>
               </a:ext>
             </a:extLst>
@@ -3783,7 +3722,7 @@
 </p:sld>
 </file>
 
-<file path=ppt/slides/slide12.xml><?xml version="1.0" encoding="utf-8"?>
+<file path=ppt/slides/slide11.xml><?xml version="1.0" encoding="utf-8"?>
 <p:sld xmlns:a="http://schemas.openxmlformats.org/drawingml/2006/main" xmlns:r="http://schemas.openxmlformats.org/officeDocument/2006/relationships" xmlns:p="http://schemas.openxmlformats.org/presentationml/2006/main">
   <p:cSld>
     <p:spTree>
@@ -3843,7 +3782,7 @@
 </p:sld>
 </file>
 
-<file path=ppt/slides/slide13.xml><?xml version="1.0" encoding="utf-8"?>
+<file path=ppt/slides/slide12.xml><?xml version="1.0" encoding="utf-8"?>
 <p:sld xmlns:a="http://schemas.openxmlformats.org/drawingml/2006/main" xmlns:r="http://schemas.openxmlformats.org/officeDocument/2006/relationships" xmlns:p="http://schemas.openxmlformats.org/presentationml/2006/main">
   <p:cSld>
     <p:spTree>
@@ -3903,7 +3842,7 @@
 </p:sld>
 </file>
 
-<file path=ppt/slides/slide14.xml><?xml version="1.0" encoding="utf-8"?>
+<file path=ppt/slides/slide13.xml><?xml version="1.0" encoding="utf-8"?>
 <p:sld xmlns:a="http://schemas.openxmlformats.org/drawingml/2006/main" xmlns:r="http://schemas.openxmlformats.org/officeDocument/2006/relationships" xmlns:p="http://schemas.openxmlformats.org/presentationml/2006/main">
   <p:cSld>
     <p:spTree>
@@ -5102,7 +5041,7 @@
           <p:cNvPr id="5" name="Picture 4">
             <a:extLst>
               <a:ext uri="{FF2B5EF4-FFF2-40B4-BE49-F238E27FC236}">
-                <a16:creationId xmlns:a16="http://schemas.microsoft.com/office/drawing/2014/main" id="{76106D4A-1B74-B960-77B5-8AD7C217315C}"/>
+                <a16:creationId xmlns:a16="http://schemas.microsoft.com/office/drawing/2014/main" id="{E71A84CA-42E3-A3E6-139C-690D56997A86}"/>
               </a:ext>
             </a:extLst>
           </p:cNvPr>
@@ -5120,7 +5059,7 @@
         <p:spPr>
           <a:xfrm>
             <a:off x="0" y="0"/>
-            <a:ext cx="11980506" cy="6866124"/>
+            <a:ext cx="11975123" cy="6858000"/>
           </a:xfrm>
           <a:prstGeom prst="rect">
             <a:avLst/>
@@ -5130,7 +5069,7 @@
     </p:spTree>
     <p:extLst>
       <p:ext uri="{BB962C8B-B14F-4D97-AF65-F5344CB8AC3E}">
-        <p14:creationId xmlns:p14="http://schemas.microsoft.com/office/powerpoint/2010/main" val="3457000223"/>
+        <p14:creationId xmlns:p14="http://schemas.microsoft.com/office/powerpoint/2010/main" val="3815287690"/>
       </p:ext>
     </p:extLst>
   </p:cSld>

</xml_diff>